<commit_message>
added slides and updated outline for regularization and overfitting
</commit_message>
<xml_diff>
--- a/slides/07_model_evaluation_and_metrics.pptx
+++ b/slides/07_model_evaluation_and_metrics.pptx
@@ -5,7 +5,7 @@
     <p:sldMasterId id="2147483648" r:id="rId1"/>
   </p:sldMasterIdLst>
   <p:notesMasterIdLst>
-    <p:notesMasterId r:id="rId22"/>
+    <p:notesMasterId r:id="rId23"/>
   </p:notesMasterIdLst>
   <p:sldIdLst>
     <p:sldId id="256" r:id="rId2"/>
@@ -25,9 +25,10 @@
     <p:sldId id="686" r:id="rId16"/>
     <p:sldId id="483" r:id="rId17"/>
     <p:sldId id="498" r:id="rId18"/>
-    <p:sldId id="508" r:id="rId19"/>
-    <p:sldId id="512" r:id="rId20"/>
-    <p:sldId id="510" r:id="rId21"/>
+    <p:sldId id="687" r:id="rId19"/>
+    <p:sldId id="508" r:id="rId20"/>
+    <p:sldId id="512" r:id="rId21"/>
+    <p:sldId id="510" r:id="rId22"/>
   </p:sldIdLst>
   <p:sldSz cx="12192000" cy="6858000"/>
   <p:notesSz cx="6858000" cy="9144000"/>
@@ -268,6 +269,140 @@
 </c:chartSpace>
 </file>
 
+<file path=ppt/charts/chart2.xml><?xml version="1.0" encoding="utf-8"?>
+<c:chartSpace xmlns:c="http://schemas.openxmlformats.org/drawingml/2006/chart" xmlns:a="http://schemas.openxmlformats.org/drawingml/2006/main" xmlns:r="http://schemas.openxmlformats.org/officeDocument/2006/relationships" xmlns:c16r2="http://schemas.microsoft.com/office/drawing/2015/06/chart">
+  <c:date1904 val="0"/>
+  <c:lang val="en-US"/>
+  <c:roundedCorners val="0"/>
+  <mc:AlternateContent xmlns:mc="http://schemas.openxmlformats.org/markup-compatibility/2006">
+    <mc:Choice xmlns:c14="http://schemas.microsoft.com/office/drawing/2007/8/2/chart" Requires="c14">
+      <c14:style val="118"/>
+    </mc:Choice>
+    <mc:Fallback>
+      <c:style val="18"/>
+    </mc:Fallback>
+  </mc:AlternateContent>
+  <c:chart>
+    <c:autoTitleDeleted val="1"/>
+    <c:plotArea>
+      <c:layout/>
+      <c:scatterChart>
+        <c:scatterStyle val="lineMarker"/>
+        <c:varyColors val="0"/>
+        <c:ser>
+          <c:idx val="0"/>
+          <c:order val="0"/>
+          <c:tx>
+            <c:strRef>
+              <c:f>Sheet1!$B$1</c:f>
+              <c:strCache>
+                <c:ptCount val="1"/>
+                <c:pt idx="0">
+                  <c:v>Y-Value 1</c:v>
+                </c:pt>
+              </c:strCache>
+            </c:strRef>
+          </c:tx>
+          <c:spPr>
+            <a:ln w="47625">
+              <a:noFill/>
+            </a:ln>
+          </c:spPr>
+          <c:xVal>
+            <c:numRef>
+              <c:f>Sheet1!$A$2</c:f>
+              <c:numCache>
+                <c:formatCode>General</c:formatCode>
+                <c:ptCount val="1"/>
+                <c:pt idx="0">
+                  <c:v>0</c:v>
+                </c:pt>
+              </c:numCache>
+            </c:numRef>
+          </c:xVal>
+          <c:yVal>
+            <c:numRef>
+              <c:f>Sheet1!$B$2</c:f>
+              <c:numCache>
+                <c:formatCode>General</c:formatCode>
+                <c:ptCount val="1"/>
+                <c:pt idx="0">
+                  <c:v>0</c:v>
+                </c:pt>
+              </c:numCache>
+            </c:numRef>
+          </c:yVal>
+          <c:smooth val="0"/>
+          <c:extLst>
+            <c:ext xmlns:c16="http://schemas.microsoft.com/office/drawing/2014/chart" uri="{C3380CC4-5D6E-409C-BE32-E72D297353CC}">
+              <c16:uniqueId val="{00000000-0B60-4946-BD5E-2B9084BE18DD}"/>
+            </c:ext>
+          </c:extLst>
+        </c:ser>
+        <c:dLbls>
+          <c:showLegendKey val="0"/>
+          <c:showVal val="0"/>
+          <c:showCatName val="0"/>
+          <c:showSerName val="0"/>
+          <c:showPercent val="0"/>
+          <c:showBubbleSize val="0"/>
+        </c:dLbls>
+        <c:axId val="34437376"/>
+        <c:axId val="34844672"/>
+      </c:scatterChart>
+      <c:valAx>
+        <c:axId val="34437376"/>
+        <c:scaling>
+          <c:orientation val="minMax"/>
+        </c:scaling>
+        <c:delete val="0"/>
+        <c:axPos val="b"/>
+        <c:numFmt formatCode="General" sourceLinked="1"/>
+        <c:majorTickMark val="out"/>
+        <c:minorTickMark val="none"/>
+        <c:tickLblPos val="nextTo"/>
+        <c:crossAx val="34844672"/>
+        <c:crosses val="autoZero"/>
+        <c:crossBetween val="midCat"/>
+        <c:majorUnit val="0.25"/>
+      </c:valAx>
+      <c:valAx>
+        <c:axId val="34844672"/>
+        <c:scaling>
+          <c:orientation val="minMax"/>
+        </c:scaling>
+        <c:delete val="0"/>
+        <c:axPos val="l"/>
+        <c:numFmt formatCode="General" sourceLinked="1"/>
+        <c:majorTickMark val="out"/>
+        <c:minorTickMark val="none"/>
+        <c:tickLblPos val="nextTo"/>
+        <c:crossAx val="34437376"/>
+        <c:crosses val="autoZero"/>
+        <c:crossBetween val="midCat"/>
+        <c:majorUnit val="0.25"/>
+      </c:valAx>
+    </c:plotArea>
+    <c:plotVisOnly val="1"/>
+    <c:dispBlanksAs val="gap"/>
+    <c:showDLblsOverMax val="0"/>
+  </c:chart>
+  <c:txPr>
+    <a:bodyPr/>
+    <a:lstStyle/>
+    <a:p>
+      <a:pPr>
+        <a:defRPr sz="1800"/>
+      </a:pPr>
+      <a:endParaRPr lang="en-US"/>
+    </a:p>
+  </c:txPr>
+  <c:externalData r:id="rId1">
+    <c:autoUpdate val="0"/>
+  </c:externalData>
+</c:chartSpace>
+</file>
+
 <file path=ppt/notesMasters/notesMaster1.xml><?xml version="1.0" encoding="utf-8"?>
 <p:notesMaster xmlns:a="http://schemas.openxmlformats.org/drawingml/2006/main" xmlns:r="http://schemas.openxmlformats.org/officeDocument/2006/relationships" xmlns:p="http://schemas.openxmlformats.org/presentationml/2006/main">
   <p:cSld>
@@ -350,7 +485,7 @@
           <a:p>
             <a:fld id="{3DB912AD-EA73-9140-98FC-984EB544AB7A}" type="datetimeFigureOut">
               <a:rPr lang="en-US" smtClean="0"/>
-              <a:t>10/4/18</a:t>
+              <a:t>10/8/18</a:t>
             </a:fld>
             <a:endParaRPr lang="en-US"/>
           </a:p>
@@ -821,6 +956,113 @@
     </p:spTree>
     <p:extLst>
       <p:ext uri="{BB962C8B-B14F-4D97-AF65-F5344CB8AC3E}">
+        <p14:creationId xmlns:p14="http://schemas.microsoft.com/office/powerpoint/2010/main" val="14310730"/>
+      </p:ext>
+    </p:extLst>
+  </p:cSld>
+  <p:clrMapOvr>
+    <a:masterClrMapping/>
+  </p:clrMapOvr>
+</p:notes>
+</file>
+
+<file path=ppt/notesSlides/notesSlide11.xml><?xml version="1.0" encoding="utf-8"?>
+<p:notes xmlns:a="http://schemas.openxmlformats.org/drawingml/2006/main" xmlns:r="http://schemas.openxmlformats.org/officeDocument/2006/relationships" xmlns:p="http://schemas.openxmlformats.org/presentationml/2006/main">
+  <p:cSld>
+    <p:spTree>
+      <p:nvGrpSpPr>
+        <p:cNvPr id="1" name=""/>
+        <p:cNvGrpSpPr/>
+        <p:nvPr/>
+      </p:nvGrpSpPr>
+      <p:grpSpPr>
+        <a:xfrm>
+          <a:off x="0" y="0"/>
+          <a:ext cx="0" cy="0"/>
+          <a:chOff x="0" y="0"/>
+          <a:chExt cx="0" cy="0"/>
+        </a:xfrm>
+      </p:grpSpPr>
+      <p:sp>
+        <p:nvSpPr>
+          <p:cNvPr id="2" name="Slide Image Placeholder 1"/>
+          <p:cNvSpPr>
+            <a:spLocks noGrp="1" noRot="1" noChangeAspect="1"/>
+          </p:cNvSpPr>
+          <p:nvPr>
+            <p:ph type="sldImg"/>
+          </p:nvPr>
+        </p:nvSpPr>
+        <p:spPr/>
+      </p:sp>
+      <p:sp>
+        <p:nvSpPr>
+          <p:cNvPr id="3" name="Notes Placeholder 2"/>
+          <p:cNvSpPr>
+            <a:spLocks noGrp="1"/>
+          </p:cNvSpPr>
+          <p:nvPr>
+            <p:ph type="body" idx="1"/>
+          </p:nvPr>
+        </p:nvSpPr>
+        <p:spPr/>
+        <p:txBody>
+          <a:bodyPr/>
+          <a:lstStyle/>
+          <a:p>
+            <a:pPr marL="0" marR="0" indent="0" algn="l" defTabSz="457200" rtl="0" eaLnBrk="1" fontAlgn="auto" latinLnBrk="0" hangingPunct="1">
+              <a:lnSpc>
+                <a:spcPct val="100000"/>
+              </a:lnSpc>
+              <a:spcBef>
+                <a:spcPts val="0"/>
+              </a:spcBef>
+              <a:spcAft>
+                <a:spcPts val="0"/>
+              </a:spcAft>
+              <a:buClrTx/>
+              <a:buSzTx/>
+              <a:buFontTx/>
+              <a:buNone/>
+              <a:tabLst/>
+              <a:defRPr/>
+            </a:pPr>
+            <a:endParaRPr lang="en-US" sz="1200" baseline="0" dirty="0">
+              <a:solidFill>
+                <a:prstClr val="black"/>
+              </a:solidFill>
+              <a:latin typeface="ArialMT"/>
+              <a:sym typeface="Wingdings"/>
+            </a:endParaRPr>
+          </a:p>
+        </p:txBody>
+      </p:sp>
+      <p:sp>
+        <p:nvSpPr>
+          <p:cNvPr id="4" name="Slide Number Placeholder 3"/>
+          <p:cNvSpPr>
+            <a:spLocks noGrp="1"/>
+          </p:cNvSpPr>
+          <p:nvPr>
+            <p:ph type="sldNum" sz="quarter" idx="10"/>
+          </p:nvPr>
+        </p:nvSpPr>
+        <p:spPr/>
+        <p:txBody>
+          <a:bodyPr/>
+          <a:lstStyle/>
+          <a:p>
+            <a:fld id="{ADD4B5B7-85EF-4E48-AC80-2380FACD9C23}" type="slidenum">
+              <a:rPr lang="en-US" smtClean="0"/>
+              <a:t>21</a:t>
+            </a:fld>
+            <a:endParaRPr lang="en-US"/>
+          </a:p>
+        </p:txBody>
+      </p:sp>
+    </p:spTree>
+    <p:extLst>
+      <p:ext uri="{BB962C8B-B14F-4D97-AF65-F5344CB8AC3E}">
         <p14:creationId xmlns:p14="http://schemas.microsoft.com/office/powerpoint/2010/main" val="2516577679"/>
       </p:ext>
     </p:extLst>
@@ -1570,7 +1812,7 @@
     </p:spTree>
     <p:extLst>
       <p:ext uri="{BB962C8B-B14F-4D97-AF65-F5344CB8AC3E}">
-        <p14:creationId xmlns:p14="http://schemas.microsoft.com/office/powerpoint/2010/main" val="1728947237"/>
+        <p14:creationId xmlns:p14="http://schemas.microsoft.com/office/powerpoint/2010/main" val="4048351428"/>
       </p:ext>
     </p:extLst>
   </p:cSld>
@@ -1677,7 +1919,7 @@
     </p:spTree>
     <p:extLst>
       <p:ext uri="{BB962C8B-B14F-4D97-AF65-F5344CB8AC3E}">
-        <p14:creationId xmlns:p14="http://schemas.microsoft.com/office/powerpoint/2010/main" val="14310730"/>
+        <p14:creationId xmlns:p14="http://schemas.microsoft.com/office/powerpoint/2010/main" val="1728947237"/>
       </p:ext>
     </p:extLst>
   </p:cSld>
@@ -1834,7 +2076,7 @@
           <a:p>
             <a:fld id="{02CE11C6-247B-0242-8651-D958C13D6FF0}" type="datetimeFigureOut">
               <a:rPr lang="en-US" smtClean="0"/>
-              <a:t>10/4/18</a:t>
+              <a:t>10/8/18</a:t>
             </a:fld>
             <a:endParaRPr lang="en-US"/>
           </a:p>
@@ -2062,7 +2304,7 @@
           <a:p>
             <a:fld id="{02CE11C6-247B-0242-8651-D958C13D6FF0}" type="datetimeFigureOut">
               <a:rPr lang="en-US" smtClean="0"/>
-              <a:t>10/4/18</a:t>
+              <a:t>10/8/18</a:t>
             </a:fld>
             <a:endParaRPr lang="en-US"/>
           </a:p>
@@ -2270,7 +2512,7 @@
           <a:p>
             <a:fld id="{02CE11C6-247B-0242-8651-D958C13D6FF0}" type="datetimeFigureOut">
               <a:rPr lang="en-US" smtClean="0"/>
-              <a:t>10/4/18</a:t>
+              <a:t>10/8/18</a:t>
             </a:fld>
             <a:endParaRPr lang="en-US"/>
           </a:p>
@@ -2735,7 +2977,7 @@
           <a:p>
             <a:fld id="{02CE11C6-247B-0242-8651-D958C13D6FF0}" type="datetimeFigureOut">
               <a:rPr lang="en-US" smtClean="0"/>
-              <a:t>10/4/18</a:t>
+              <a:t>10/8/18</a:t>
             </a:fld>
             <a:endParaRPr lang="en-US"/>
           </a:p>
@@ -3010,7 +3252,7 @@
           <a:p>
             <a:fld id="{02CE11C6-247B-0242-8651-D958C13D6FF0}" type="datetimeFigureOut">
               <a:rPr lang="en-US" smtClean="0"/>
-              <a:t>10/4/18</a:t>
+              <a:t>10/8/18</a:t>
             </a:fld>
             <a:endParaRPr lang="en-US"/>
           </a:p>
@@ -3275,7 +3517,7 @@
           <a:p>
             <a:fld id="{02CE11C6-247B-0242-8651-D958C13D6FF0}" type="datetimeFigureOut">
               <a:rPr lang="en-US" smtClean="0"/>
-              <a:t>10/4/18</a:t>
+              <a:t>10/8/18</a:t>
             </a:fld>
             <a:endParaRPr lang="en-US"/>
           </a:p>
@@ -3687,7 +3929,7 @@
           <a:p>
             <a:fld id="{02CE11C6-247B-0242-8651-D958C13D6FF0}" type="datetimeFigureOut">
               <a:rPr lang="en-US" smtClean="0"/>
-              <a:t>10/4/18</a:t>
+              <a:t>10/8/18</a:t>
             </a:fld>
             <a:endParaRPr lang="en-US"/>
           </a:p>
@@ -3828,7 +4070,7 @@
           <a:p>
             <a:fld id="{02CE11C6-247B-0242-8651-D958C13D6FF0}" type="datetimeFigureOut">
               <a:rPr lang="en-US" smtClean="0"/>
-              <a:t>10/4/18</a:t>
+              <a:t>10/8/18</a:t>
             </a:fld>
             <a:endParaRPr lang="en-US"/>
           </a:p>
@@ -3941,7 +4183,7 @@
           <a:p>
             <a:fld id="{02CE11C6-247B-0242-8651-D958C13D6FF0}" type="datetimeFigureOut">
               <a:rPr lang="en-US" smtClean="0"/>
-              <a:t>10/4/18</a:t>
+              <a:t>10/8/18</a:t>
             </a:fld>
             <a:endParaRPr lang="en-US"/>
           </a:p>
@@ -4252,7 +4494,7 @@
           <a:p>
             <a:fld id="{02CE11C6-247B-0242-8651-D958C13D6FF0}" type="datetimeFigureOut">
               <a:rPr lang="en-US" smtClean="0"/>
-              <a:t>10/4/18</a:t>
+              <a:t>10/8/18</a:t>
             </a:fld>
             <a:endParaRPr lang="en-US"/>
           </a:p>
@@ -4540,7 +4782,7 @@
           <a:p>
             <a:fld id="{02CE11C6-247B-0242-8651-D958C13D6FF0}" type="datetimeFigureOut">
               <a:rPr lang="en-US" smtClean="0"/>
-              <a:t>10/4/18</a:t>
+              <a:t>10/8/18</a:t>
             </a:fld>
             <a:endParaRPr lang="en-US"/>
           </a:p>
@@ -4781,7 +5023,7 @@
           <a:p>
             <a:fld id="{02CE11C6-247B-0242-8651-D958C13D6FF0}" type="datetimeFigureOut">
               <a:rPr lang="en-US" smtClean="0"/>
-              <a:t>10/4/18</a:t>
+              <a:t>10/8/18</a:t>
             </a:fld>
             <a:endParaRPr lang="en-US"/>
           </a:p>
@@ -6796,7 +7038,11 @@
             <a:graphicFrameLocks noGrp="1"/>
           </p:cNvGraphicFramePr>
           <p:nvPr>
-            <p:extLst/>
+            <p:extLst>
+              <p:ext uri="{D42A27DB-BD31-4B8C-83A1-F6EECF244321}">
+                <p14:modId xmlns:p14="http://schemas.microsoft.com/office/powerpoint/2010/main" val="2828527490"/>
+              </p:ext>
+            </p:extLst>
           </p:nvPr>
         </p:nvGraphicFramePr>
         <p:xfrm>
@@ -7432,6 +7678,908 @@
         </p:nvSpPr>
         <p:spPr>
           <a:xfrm>
+            <a:off x="8310850" y="1246100"/>
+            <a:ext cx="1984456" cy="461665"/>
+          </a:xfrm>
+          <a:prstGeom prst="rect">
+            <a:avLst/>
+          </a:prstGeom>
+          <a:noFill/>
+        </p:spPr>
+        <p:txBody>
+          <a:bodyPr wrap="square" rtlCol="0">
+            <a:spAutoFit/>
+          </a:bodyPr>
+          <a:lstStyle/>
+          <a:p>
+            <a:pPr algn="l"/>
+            <a:r>
+              <a:rPr lang="en-US" sz="2400" dirty="0">
+                <a:latin typeface="PFDinTextCompPro-Italic"/>
+                <a:cs typeface="PFDinTextCompPro-Italic"/>
+              </a:rPr>
+              <a:t>ROC Curve</a:t>
+            </a:r>
+          </a:p>
+        </p:txBody>
+      </p:sp>
+      <p:sp>
+        <p:nvSpPr>
+          <p:cNvPr id="8" name="Slide Number Placeholder 3"/>
+          <p:cNvSpPr>
+            <a:spLocks noGrp="1"/>
+          </p:cNvSpPr>
+          <p:nvPr>
+            <p:ph type="sldNum" sz="quarter" idx="13"/>
+          </p:nvPr>
+        </p:nvSpPr>
+        <p:spPr/>
+        <p:txBody>
+          <a:bodyPr/>
+          <a:lstStyle/>
+          <a:p>
+            <a:pPr>
+              <a:defRPr/>
+            </a:pPr>
+            <a:fld id="{BD5AD749-DAD1-6A4A-A2AA-CB20EAD0AEB7}" type="slidenum">
+              <a:rPr lang="en-US"/>
+              <a:pPr>
+                <a:defRPr/>
+              </a:pPr>
+              <a:t>18</a:t>
+            </a:fld>
+            <a:endParaRPr lang="en-US"/>
+          </a:p>
+        </p:txBody>
+      </p:sp>
+      <p:graphicFrame>
+        <p:nvGraphicFramePr>
+          <p:cNvPr id="2" name="Table 1"/>
+          <p:cNvGraphicFramePr>
+            <a:graphicFrameLocks noGrp="1"/>
+          </p:cNvGraphicFramePr>
+          <p:nvPr>
+            <p:extLst>
+              <p:ext uri="{D42A27DB-BD31-4B8C-83A1-F6EECF244321}">
+                <p14:modId xmlns:p14="http://schemas.microsoft.com/office/powerpoint/2010/main" val="2406072321"/>
+              </p:ext>
+            </p:extLst>
+          </p:nvPr>
+        </p:nvGraphicFramePr>
+        <p:xfrm>
+          <a:off x="264011" y="1273337"/>
+          <a:ext cx="5297545" cy="5003540"/>
+        </p:xfrm>
+        <a:graphic>
+          <a:graphicData uri="http://schemas.openxmlformats.org/drawingml/2006/table">
+            <a:tbl>
+              <a:tblPr firstRow="1" bandRow="1">
+                <a:tableStyleId>{5C22544A-7EE6-4342-B048-85BDC9FD1C3A}</a:tableStyleId>
+              </a:tblPr>
+              <a:tblGrid>
+                <a:gridCol w="626303">
+                  <a:extLst>
+                    <a:ext uri="{9D8B030D-6E8A-4147-A177-3AD203B41FA5}">
+                      <a16:colId xmlns:a16="http://schemas.microsoft.com/office/drawing/2014/main" val="20000"/>
+                    </a:ext>
+                  </a:extLst>
+                </a:gridCol>
+                <a:gridCol w="2141951">
+                  <a:extLst>
+                    <a:ext uri="{9D8B030D-6E8A-4147-A177-3AD203B41FA5}">
+                      <a16:colId xmlns:a16="http://schemas.microsoft.com/office/drawing/2014/main" val="20001"/>
+                    </a:ext>
+                  </a:extLst>
+                </a:gridCol>
+                <a:gridCol w="926926">
+                  <a:extLst>
+                    <a:ext uri="{9D8B030D-6E8A-4147-A177-3AD203B41FA5}">
+                      <a16:colId xmlns:a16="http://schemas.microsoft.com/office/drawing/2014/main" val="20002"/>
+                    </a:ext>
+                  </a:extLst>
+                </a:gridCol>
+                <a:gridCol w="838277">
+                  <a:extLst>
+                    <a:ext uri="{9D8B030D-6E8A-4147-A177-3AD203B41FA5}">
+                      <a16:colId xmlns:a16="http://schemas.microsoft.com/office/drawing/2014/main" val="2893165709"/>
+                    </a:ext>
+                  </a:extLst>
+                </a:gridCol>
+                <a:gridCol w="764088">
+                  <a:extLst>
+                    <a:ext uri="{9D8B030D-6E8A-4147-A177-3AD203B41FA5}">
+                      <a16:colId xmlns:a16="http://schemas.microsoft.com/office/drawing/2014/main" val="3007780161"/>
+                    </a:ext>
+                  </a:extLst>
+                </a:gridCol>
+              </a:tblGrid>
+              <a:tr h="1178844">
+                <a:tc>
+                  <a:txBody>
+                    <a:bodyPr/>
+                    <a:lstStyle/>
+                    <a:p>
+                      <a:r>
+                        <a:rPr lang="en-US" sz="2300" dirty="0"/>
+                        <a:t>ID</a:t>
+                      </a:r>
+                    </a:p>
+                  </a:txBody>
+                  <a:tcPr marL="119067" marR="119067" marT="59534" marB="59534"/>
+                </a:tc>
+                <a:tc>
+                  <a:txBody>
+                    <a:bodyPr/>
+                    <a:lstStyle/>
+                    <a:p>
+                      <a:r>
+                        <a:rPr lang="en-US" sz="2300" dirty="0"/>
+                        <a:t>Classifier Score</a:t>
+                      </a:r>
+                    </a:p>
+                  </a:txBody>
+                  <a:tcPr marL="119067" marR="119067" marT="59534" marB="59534"/>
+                </a:tc>
+                <a:tc>
+                  <a:txBody>
+                    <a:bodyPr/>
+                    <a:lstStyle/>
+                    <a:p>
+                      <a:r>
+                        <a:rPr lang="en-US" sz="2300" dirty="0"/>
+                        <a:t>True Label</a:t>
+                      </a:r>
+                    </a:p>
+                  </a:txBody>
+                  <a:tcPr marL="119067" marR="119067" marT="59534" marB="59534"/>
+                </a:tc>
+                <a:tc>
+                  <a:txBody>
+                    <a:bodyPr/>
+                    <a:lstStyle/>
+                    <a:p>
+                      <a:r>
+                        <a:rPr lang="en-US" sz="2300" dirty="0"/>
+                        <a:t>TPR</a:t>
+                      </a:r>
+                    </a:p>
+                  </a:txBody>
+                  <a:tcPr marL="119067" marR="119067" marT="59534" marB="59534"/>
+                </a:tc>
+                <a:tc>
+                  <a:txBody>
+                    <a:bodyPr/>
+                    <a:lstStyle/>
+                    <a:p>
+                      <a:r>
+                        <a:rPr lang="en-US" sz="2300" dirty="0"/>
+                        <a:t>FPR</a:t>
+                      </a:r>
+                    </a:p>
+                  </a:txBody>
+                  <a:tcPr marL="119067" marR="119067" marT="59534" marB="59534"/>
+                </a:tc>
+                <a:extLst>
+                  <a:ext uri="{0D108BD9-81ED-4DB2-BD59-A6C34878D82A}">
+                    <a16:rowId xmlns:a16="http://schemas.microsoft.com/office/drawing/2014/main" val="10000"/>
+                  </a:ext>
+                </a:extLst>
+              </a:tr>
+              <a:tr h="478087">
+                <a:tc>
+                  <a:txBody>
+                    <a:bodyPr/>
+                    <a:lstStyle/>
+                    <a:p>
+                      <a:r>
+                        <a:rPr lang="en-US" sz="2300" dirty="0"/>
+                        <a:t>5</a:t>
+                      </a:r>
+                    </a:p>
+                  </a:txBody>
+                  <a:tcPr marL="119067" marR="119067" marT="59534" marB="59534"/>
+                </a:tc>
+                <a:tc>
+                  <a:txBody>
+                    <a:bodyPr/>
+                    <a:lstStyle/>
+                    <a:p>
+                      <a:r>
+                        <a:rPr lang="en-US" sz="2300"/>
+                        <a:t>0.99</a:t>
+                      </a:r>
+                      <a:endParaRPr lang="en-US" sz="2300" dirty="0"/>
+                    </a:p>
+                  </a:txBody>
+                  <a:tcPr marL="119067" marR="119067" marT="59534" marB="59534"/>
+                </a:tc>
+                <a:tc>
+                  <a:txBody>
+                    <a:bodyPr/>
+                    <a:lstStyle/>
+                    <a:p>
+                      <a:r>
+                        <a:rPr lang="en-US" sz="2300" dirty="0"/>
+                        <a:t>T</a:t>
+                      </a:r>
+                    </a:p>
+                  </a:txBody>
+                  <a:tcPr marL="119067" marR="119067" marT="59534" marB="59534"/>
+                </a:tc>
+                <a:tc>
+                  <a:txBody>
+                    <a:bodyPr/>
+                    <a:lstStyle/>
+                    <a:p>
+                      <a:endParaRPr lang="en-US" sz="2300" dirty="0"/>
+                    </a:p>
+                  </a:txBody>
+                  <a:tcPr marL="119067" marR="119067" marT="59534" marB="59534"/>
+                </a:tc>
+                <a:tc>
+                  <a:txBody>
+                    <a:bodyPr/>
+                    <a:lstStyle/>
+                    <a:p>
+                      <a:endParaRPr lang="en-US" sz="2300" dirty="0"/>
+                    </a:p>
+                  </a:txBody>
+                  <a:tcPr marL="119067" marR="119067" marT="59534" marB="59534"/>
+                </a:tc>
+                <a:extLst>
+                  <a:ext uri="{0D108BD9-81ED-4DB2-BD59-A6C34878D82A}">
+                    <a16:rowId xmlns:a16="http://schemas.microsoft.com/office/drawing/2014/main" val="10001"/>
+                  </a:ext>
+                </a:extLst>
+              </a:tr>
+              <a:tr h="478087">
+                <a:tc>
+                  <a:txBody>
+                    <a:bodyPr/>
+                    <a:lstStyle/>
+                    <a:p>
+                      <a:r>
+                        <a:rPr lang="en-US" sz="2300" dirty="0"/>
+                        <a:t>8</a:t>
+                      </a:r>
+                    </a:p>
+                  </a:txBody>
+                  <a:tcPr marL="119067" marR="119067" marT="59534" marB="59534"/>
+                </a:tc>
+                <a:tc>
+                  <a:txBody>
+                    <a:bodyPr/>
+                    <a:lstStyle/>
+                    <a:p>
+                      <a:r>
+                        <a:rPr lang="en-US" sz="2300"/>
+                        <a:t>0.82</a:t>
+                      </a:r>
+                      <a:endParaRPr lang="en-US" sz="2300" dirty="0"/>
+                    </a:p>
+                  </a:txBody>
+                  <a:tcPr marL="119067" marR="119067" marT="59534" marB="59534"/>
+                </a:tc>
+                <a:tc>
+                  <a:txBody>
+                    <a:bodyPr/>
+                    <a:lstStyle/>
+                    <a:p>
+                      <a:r>
+                        <a:rPr lang="en-US" sz="2300" dirty="0"/>
+                        <a:t>T</a:t>
+                      </a:r>
+                    </a:p>
+                  </a:txBody>
+                  <a:tcPr marL="119067" marR="119067" marT="59534" marB="59534"/>
+                </a:tc>
+                <a:tc>
+                  <a:txBody>
+                    <a:bodyPr/>
+                    <a:lstStyle/>
+                    <a:p>
+                      <a:endParaRPr lang="en-US" sz="2300" dirty="0"/>
+                    </a:p>
+                  </a:txBody>
+                  <a:tcPr marL="119067" marR="119067" marT="59534" marB="59534"/>
+                </a:tc>
+                <a:tc>
+                  <a:txBody>
+                    <a:bodyPr/>
+                    <a:lstStyle/>
+                    <a:p>
+                      <a:endParaRPr lang="en-US" sz="2300" dirty="0"/>
+                    </a:p>
+                  </a:txBody>
+                  <a:tcPr marL="119067" marR="119067" marT="59534" marB="59534"/>
+                </a:tc>
+                <a:extLst>
+                  <a:ext uri="{0D108BD9-81ED-4DB2-BD59-A6C34878D82A}">
+                    <a16:rowId xmlns:a16="http://schemas.microsoft.com/office/drawing/2014/main" val="10002"/>
+                  </a:ext>
+                </a:extLst>
+              </a:tr>
+              <a:tr h="478087">
+                <a:tc>
+                  <a:txBody>
+                    <a:bodyPr/>
+                    <a:lstStyle/>
+                    <a:p>
+                      <a:r>
+                        <a:rPr lang="en-US" sz="2300" dirty="0"/>
+                        <a:t>2</a:t>
+                      </a:r>
+                    </a:p>
+                  </a:txBody>
+                  <a:tcPr marL="119067" marR="119067" marT="59534" marB="59534"/>
+                </a:tc>
+                <a:tc>
+                  <a:txBody>
+                    <a:bodyPr/>
+                    <a:lstStyle/>
+                    <a:p>
+                      <a:r>
+                        <a:rPr lang="en-US" sz="2300" dirty="0"/>
+                        <a:t>0.72</a:t>
+                      </a:r>
+                    </a:p>
+                  </a:txBody>
+                  <a:tcPr marL="119067" marR="119067" marT="59534" marB="59534"/>
+                </a:tc>
+                <a:tc>
+                  <a:txBody>
+                    <a:bodyPr/>
+                    <a:lstStyle/>
+                    <a:p>
+                      <a:r>
+                        <a:rPr lang="en-US" sz="2300" dirty="0"/>
+                        <a:t>F</a:t>
+                      </a:r>
+                    </a:p>
+                  </a:txBody>
+                  <a:tcPr marL="119067" marR="119067" marT="59534" marB="59534"/>
+                </a:tc>
+                <a:tc>
+                  <a:txBody>
+                    <a:bodyPr/>
+                    <a:lstStyle/>
+                    <a:p>
+                      <a:endParaRPr lang="en-US" sz="2300" dirty="0"/>
+                    </a:p>
+                  </a:txBody>
+                  <a:tcPr marL="119067" marR="119067" marT="59534" marB="59534"/>
+                </a:tc>
+                <a:tc>
+                  <a:txBody>
+                    <a:bodyPr/>
+                    <a:lstStyle/>
+                    <a:p>
+                      <a:endParaRPr lang="en-US" sz="2300" dirty="0"/>
+                    </a:p>
+                  </a:txBody>
+                  <a:tcPr marL="119067" marR="119067" marT="59534" marB="59534"/>
+                </a:tc>
+                <a:extLst>
+                  <a:ext uri="{0D108BD9-81ED-4DB2-BD59-A6C34878D82A}">
+                    <a16:rowId xmlns:a16="http://schemas.microsoft.com/office/drawing/2014/main" val="10003"/>
+                  </a:ext>
+                </a:extLst>
+              </a:tr>
+              <a:tr h="478087">
+                <a:tc>
+                  <a:txBody>
+                    <a:bodyPr/>
+                    <a:lstStyle/>
+                    <a:p>
+                      <a:r>
+                        <a:rPr lang="en-US" sz="2300" dirty="0"/>
+                        <a:t>1</a:t>
+                      </a:r>
+                    </a:p>
+                  </a:txBody>
+                  <a:tcPr marL="119067" marR="119067" marT="59534" marB="59534"/>
+                </a:tc>
+                <a:tc>
+                  <a:txBody>
+                    <a:bodyPr/>
+                    <a:lstStyle/>
+                    <a:p>
+                      <a:r>
+                        <a:rPr lang="en-US" sz="2300" dirty="0"/>
+                        <a:t>0.68</a:t>
+                      </a:r>
+                    </a:p>
+                  </a:txBody>
+                  <a:tcPr marL="119067" marR="119067" marT="59534" marB="59534"/>
+                </a:tc>
+                <a:tc>
+                  <a:txBody>
+                    <a:bodyPr/>
+                    <a:lstStyle/>
+                    <a:p>
+                      <a:r>
+                        <a:rPr lang="en-US" sz="2300" dirty="0"/>
+                        <a:t>T</a:t>
+                      </a:r>
+                    </a:p>
+                  </a:txBody>
+                  <a:tcPr marL="119067" marR="119067" marT="59534" marB="59534"/>
+                </a:tc>
+                <a:tc>
+                  <a:txBody>
+                    <a:bodyPr/>
+                    <a:lstStyle/>
+                    <a:p>
+                      <a:endParaRPr lang="en-US" sz="2300" dirty="0"/>
+                    </a:p>
+                  </a:txBody>
+                  <a:tcPr marL="119067" marR="119067" marT="59534" marB="59534"/>
+                </a:tc>
+                <a:tc>
+                  <a:txBody>
+                    <a:bodyPr/>
+                    <a:lstStyle/>
+                    <a:p>
+                      <a:endParaRPr lang="en-US" sz="2300" dirty="0"/>
+                    </a:p>
+                  </a:txBody>
+                  <a:tcPr marL="119067" marR="119067" marT="59534" marB="59534"/>
+                </a:tc>
+                <a:extLst>
+                  <a:ext uri="{0D108BD9-81ED-4DB2-BD59-A6C34878D82A}">
+                    <a16:rowId xmlns:a16="http://schemas.microsoft.com/office/drawing/2014/main" val="10004"/>
+                  </a:ext>
+                </a:extLst>
+              </a:tr>
+              <a:tr h="478087">
+                <a:tc>
+                  <a:txBody>
+                    <a:bodyPr/>
+                    <a:lstStyle/>
+                    <a:p>
+                      <a:r>
+                        <a:rPr lang="en-US" sz="2300" dirty="0"/>
+                        <a:t>7</a:t>
+                      </a:r>
+                    </a:p>
+                  </a:txBody>
+                  <a:tcPr marL="119067" marR="119067" marT="59534" marB="59534"/>
+                </a:tc>
+                <a:tc>
+                  <a:txBody>
+                    <a:bodyPr/>
+                    <a:lstStyle/>
+                    <a:p>
+                      <a:r>
+                        <a:rPr lang="en-US" sz="2300" dirty="0"/>
+                        <a:t>0.51</a:t>
+                      </a:r>
+                    </a:p>
+                  </a:txBody>
+                  <a:tcPr marL="119067" marR="119067" marT="59534" marB="59534"/>
+                </a:tc>
+                <a:tc>
+                  <a:txBody>
+                    <a:bodyPr/>
+                    <a:lstStyle/>
+                    <a:p>
+                      <a:r>
+                        <a:rPr lang="en-US" sz="2300" dirty="0"/>
+                        <a:t>F</a:t>
+                      </a:r>
+                    </a:p>
+                  </a:txBody>
+                  <a:tcPr marL="119067" marR="119067" marT="59534" marB="59534"/>
+                </a:tc>
+                <a:tc>
+                  <a:txBody>
+                    <a:bodyPr/>
+                    <a:lstStyle/>
+                    <a:p>
+                      <a:endParaRPr lang="en-US" sz="2300" dirty="0"/>
+                    </a:p>
+                  </a:txBody>
+                  <a:tcPr marL="119067" marR="119067" marT="59534" marB="59534"/>
+                </a:tc>
+                <a:tc>
+                  <a:txBody>
+                    <a:bodyPr/>
+                    <a:lstStyle/>
+                    <a:p>
+                      <a:endParaRPr lang="en-US" sz="2300" dirty="0"/>
+                    </a:p>
+                  </a:txBody>
+                  <a:tcPr marL="119067" marR="119067" marT="59534" marB="59534"/>
+                </a:tc>
+                <a:extLst>
+                  <a:ext uri="{0D108BD9-81ED-4DB2-BD59-A6C34878D82A}">
+                    <a16:rowId xmlns:a16="http://schemas.microsoft.com/office/drawing/2014/main" val="10005"/>
+                  </a:ext>
+                </a:extLst>
+              </a:tr>
+              <a:tr h="478087">
+                <a:tc>
+                  <a:txBody>
+                    <a:bodyPr/>
+                    <a:lstStyle/>
+                    <a:p>
+                      <a:r>
+                        <a:rPr lang="en-US" sz="2300" dirty="0"/>
+                        <a:t>3</a:t>
+                      </a:r>
+                    </a:p>
+                  </a:txBody>
+                  <a:tcPr marL="119067" marR="119067" marT="59534" marB="59534"/>
+                </a:tc>
+                <a:tc>
+                  <a:txBody>
+                    <a:bodyPr/>
+                    <a:lstStyle/>
+                    <a:p>
+                      <a:r>
+                        <a:rPr lang="en-US" sz="2300" dirty="0"/>
+                        <a:t>0.48</a:t>
+                      </a:r>
+                    </a:p>
+                  </a:txBody>
+                  <a:tcPr marL="119067" marR="119067" marT="59534" marB="59534"/>
+                </a:tc>
+                <a:tc>
+                  <a:txBody>
+                    <a:bodyPr/>
+                    <a:lstStyle/>
+                    <a:p>
+                      <a:r>
+                        <a:rPr lang="en-US" sz="2300" dirty="0"/>
+                        <a:t>T</a:t>
+                      </a:r>
+                    </a:p>
+                  </a:txBody>
+                  <a:tcPr marL="119067" marR="119067" marT="59534" marB="59534"/>
+                </a:tc>
+                <a:tc>
+                  <a:txBody>
+                    <a:bodyPr/>
+                    <a:lstStyle/>
+                    <a:p>
+                      <a:endParaRPr lang="en-US" sz="2300" dirty="0"/>
+                    </a:p>
+                  </a:txBody>
+                  <a:tcPr marL="119067" marR="119067" marT="59534" marB="59534"/>
+                </a:tc>
+                <a:tc>
+                  <a:txBody>
+                    <a:bodyPr/>
+                    <a:lstStyle/>
+                    <a:p>
+                      <a:endParaRPr lang="en-US" sz="2300" dirty="0"/>
+                    </a:p>
+                  </a:txBody>
+                  <a:tcPr marL="119067" marR="119067" marT="59534" marB="59534"/>
+                </a:tc>
+                <a:extLst>
+                  <a:ext uri="{0D108BD9-81ED-4DB2-BD59-A6C34878D82A}">
+                    <a16:rowId xmlns:a16="http://schemas.microsoft.com/office/drawing/2014/main" val="10006"/>
+                  </a:ext>
+                </a:extLst>
+              </a:tr>
+              <a:tr h="478087">
+                <a:tc>
+                  <a:txBody>
+                    <a:bodyPr/>
+                    <a:lstStyle/>
+                    <a:p>
+                      <a:r>
+                        <a:rPr lang="en-US" sz="2300" dirty="0"/>
+                        <a:t>4</a:t>
+                      </a:r>
+                    </a:p>
+                  </a:txBody>
+                  <a:tcPr marL="119067" marR="119067" marT="59534" marB="59534"/>
+                </a:tc>
+                <a:tc>
+                  <a:txBody>
+                    <a:bodyPr/>
+                    <a:lstStyle/>
+                    <a:p>
+                      <a:r>
+                        <a:rPr lang="en-US" sz="2300" dirty="0"/>
+                        <a:t>0.30</a:t>
+                      </a:r>
+                    </a:p>
+                  </a:txBody>
+                  <a:tcPr marL="119067" marR="119067" marT="59534" marB="59534"/>
+                </a:tc>
+                <a:tc>
+                  <a:txBody>
+                    <a:bodyPr/>
+                    <a:lstStyle/>
+                    <a:p>
+                      <a:r>
+                        <a:rPr lang="en-US" sz="2300" dirty="0"/>
+                        <a:t>F</a:t>
+                      </a:r>
+                    </a:p>
+                  </a:txBody>
+                  <a:tcPr marL="119067" marR="119067" marT="59534" marB="59534"/>
+                </a:tc>
+                <a:tc>
+                  <a:txBody>
+                    <a:bodyPr/>
+                    <a:lstStyle/>
+                    <a:p>
+                      <a:endParaRPr lang="en-US" sz="2300" dirty="0"/>
+                    </a:p>
+                  </a:txBody>
+                  <a:tcPr marL="119067" marR="119067" marT="59534" marB="59534"/>
+                </a:tc>
+                <a:tc>
+                  <a:txBody>
+                    <a:bodyPr/>
+                    <a:lstStyle/>
+                    <a:p>
+                      <a:endParaRPr lang="en-US" sz="2300" dirty="0"/>
+                    </a:p>
+                  </a:txBody>
+                  <a:tcPr marL="119067" marR="119067" marT="59534" marB="59534"/>
+                </a:tc>
+                <a:extLst>
+                  <a:ext uri="{0D108BD9-81ED-4DB2-BD59-A6C34878D82A}">
+                    <a16:rowId xmlns:a16="http://schemas.microsoft.com/office/drawing/2014/main" val="10007"/>
+                  </a:ext>
+                </a:extLst>
+              </a:tr>
+              <a:tr h="478087">
+                <a:tc>
+                  <a:txBody>
+                    <a:bodyPr/>
+                    <a:lstStyle/>
+                    <a:p>
+                      <a:r>
+                        <a:rPr lang="en-US" sz="2300" dirty="0"/>
+                        <a:t>6</a:t>
+                      </a:r>
+                    </a:p>
+                  </a:txBody>
+                  <a:tcPr marL="119067" marR="119067" marT="59534" marB="59534"/>
+                </a:tc>
+                <a:tc>
+                  <a:txBody>
+                    <a:bodyPr/>
+                    <a:lstStyle/>
+                    <a:p>
+                      <a:r>
+                        <a:rPr lang="en-US" sz="2300" dirty="0"/>
+                        <a:t>0.02</a:t>
+                      </a:r>
+                    </a:p>
+                  </a:txBody>
+                  <a:tcPr marL="119067" marR="119067" marT="59534" marB="59534"/>
+                </a:tc>
+                <a:tc>
+                  <a:txBody>
+                    <a:bodyPr/>
+                    <a:lstStyle/>
+                    <a:p>
+                      <a:r>
+                        <a:rPr lang="en-US" sz="2300" dirty="0"/>
+                        <a:t>F</a:t>
+                      </a:r>
+                    </a:p>
+                  </a:txBody>
+                  <a:tcPr marL="119067" marR="119067" marT="59534" marB="59534"/>
+                </a:tc>
+                <a:tc>
+                  <a:txBody>
+                    <a:bodyPr/>
+                    <a:lstStyle/>
+                    <a:p>
+                      <a:endParaRPr lang="en-US" sz="2300" dirty="0"/>
+                    </a:p>
+                  </a:txBody>
+                  <a:tcPr marL="119067" marR="119067" marT="59534" marB="59534"/>
+                </a:tc>
+                <a:tc>
+                  <a:txBody>
+                    <a:bodyPr/>
+                    <a:lstStyle/>
+                    <a:p>
+                      <a:endParaRPr lang="en-US" sz="2300" dirty="0"/>
+                    </a:p>
+                  </a:txBody>
+                  <a:tcPr marL="119067" marR="119067" marT="59534" marB="59534"/>
+                </a:tc>
+                <a:extLst>
+                  <a:ext uri="{0D108BD9-81ED-4DB2-BD59-A6C34878D82A}">
+                    <a16:rowId xmlns:a16="http://schemas.microsoft.com/office/drawing/2014/main" val="10008"/>
+                  </a:ext>
+                </a:extLst>
+              </a:tr>
+            </a:tbl>
+          </a:graphicData>
+        </a:graphic>
+      </p:graphicFrame>
+      <p:graphicFrame>
+        <p:nvGraphicFramePr>
+          <p:cNvPr id="3" name="Chart 2"/>
+          <p:cNvGraphicFramePr/>
+          <p:nvPr>
+            <p:extLst>
+              <p:ext uri="{D42A27DB-BD31-4B8C-83A1-F6EECF244321}">
+                <p14:modId xmlns:p14="http://schemas.microsoft.com/office/powerpoint/2010/main" val="1701654454"/>
+              </p:ext>
+            </p:extLst>
+          </p:nvPr>
+        </p:nvGraphicFramePr>
+        <p:xfrm>
+          <a:off x="6212909" y="2038245"/>
+          <a:ext cx="5745120" cy="4100089"/>
+        </p:xfrm>
+        <a:graphic>
+          <a:graphicData uri="http://schemas.openxmlformats.org/drawingml/2006/chart">
+            <c:chart xmlns:c="http://schemas.openxmlformats.org/drawingml/2006/chart" xmlns:r="http://schemas.openxmlformats.org/officeDocument/2006/relationships" r:id="rId3"/>
+          </a:graphicData>
+        </a:graphic>
+      </p:graphicFrame>
+      <p:sp>
+        <p:nvSpPr>
+          <p:cNvPr id="7" name="TextBox 6"/>
+          <p:cNvSpPr txBox="1"/>
+          <p:nvPr/>
+        </p:nvSpPr>
+        <p:spPr>
+          <a:xfrm>
+            <a:off x="9179788" y="6008793"/>
+            <a:ext cx="893005" cy="461665"/>
+          </a:xfrm>
+          <a:prstGeom prst="rect">
+            <a:avLst/>
+          </a:prstGeom>
+          <a:noFill/>
+        </p:spPr>
+        <p:txBody>
+          <a:bodyPr wrap="square" rtlCol="0">
+            <a:spAutoFit/>
+          </a:bodyPr>
+          <a:lstStyle/>
+          <a:p>
+            <a:pPr algn="l"/>
+            <a:r>
+              <a:rPr lang="en-US" sz="2400" dirty="0">
+                <a:latin typeface="PFDinTextCompPro-Italic"/>
+                <a:cs typeface="PFDinTextCompPro-Italic"/>
+              </a:rPr>
+              <a:t>FPR</a:t>
+            </a:r>
+          </a:p>
+        </p:txBody>
+      </p:sp>
+      <p:sp>
+        <p:nvSpPr>
+          <p:cNvPr id="9" name="TextBox 8"/>
+          <p:cNvSpPr txBox="1"/>
+          <p:nvPr/>
+        </p:nvSpPr>
+        <p:spPr>
+          <a:xfrm>
+            <a:off x="5806213" y="3329778"/>
+            <a:ext cx="893005" cy="461665"/>
+          </a:xfrm>
+          <a:prstGeom prst="rect">
+            <a:avLst/>
+          </a:prstGeom>
+          <a:noFill/>
+        </p:spPr>
+        <p:txBody>
+          <a:bodyPr wrap="square" rtlCol="0">
+            <a:spAutoFit/>
+          </a:bodyPr>
+          <a:lstStyle/>
+          <a:p>
+            <a:pPr algn="l"/>
+            <a:r>
+              <a:rPr lang="en-US" sz="2400" dirty="0">
+                <a:latin typeface="PFDinTextCompPro-Italic"/>
+                <a:cs typeface="PFDinTextCompPro-Italic"/>
+              </a:rPr>
+              <a:t>TPR</a:t>
+            </a:r>
+          </a:p>
+        </p:txBody>
+      </p:sp>
+      <p:sp>
+        <p:nvSpPr>
+          <p:cNvPr id="11" name="Title 1">
+            <a:extLst>
+              <a:ext uri="{FF2B5EF4-FFF2-40B4-BE49-F238E27FC236}">
+                <a16:creationId xmlns:a16="http://schemas.microsoft.com/office/drawing/2014/main" id="{278B0ED0-5593-DA49-A9B8-9B7A45F4DA3C}"/>
+              </a:ext>
+            </a:extLst>
+          </p:cNvPr>
+          <p:cNvSpPr txBox="1">
+            <a:spLocks/>
+          </p:cNvSpPr>
+          <p:nvPr/>
+        </p:nvSpPr>
+        <p:spPr>
+          <a:xfrm>
+            <a:off x="548413" y="-217466"/>
+            <a:ext cx="10515600" cy="1325563"/>
+          </a:xfrm>
+          <a:prstGeom prst="rect">
+            <a:avLst/>
+          </a:prstGeom>
+        </p:spPr>
+        <p:txBody>
+          <a:bodyPr vert="horz" lIns="0" tIns="32914" rIns="65828" bIns="32914" rtlCol="0" anchor="ctr">
+            <a:normAutofit/>
+          </a:bodyPr>
+          <a:lstStyle>
+            <a:lvl1pPr algn="l" defTabSz="914400" rtl="0" eaLnBrk="1" latinLnBrk="0" hangingPunct="1">
+              <a:lnSpc>
+                <a:spcPts val="4686"/>
+              </a:lnSpc>
+              <a:spcBef>
+                <a:spcPct val="0"/>
+              </a:spcBef>
+              <a:buNone/>
+              <a:defRPr sz="5078" b="1" kern="1200" cap="all" baseline="0">
+                <a:solidFill>
+                  <a:schemeClr val="tx1"/>
+                </a:solidFill>
+                <a:latin typeface="+mj-lt"/>
+                <a:ea typeface="+mj-ea"/>
+                <a:cs typeface="+mj-cs"/>
+              </a:defRPr>
+            </a:lvl1pPr>
+          </a:lstStyle>
+          <a:p>
+            <a:r>
+              <a:rPr lang="en-US" sz="4000" b="0" cap="none" dirty="0"/>
+              <a:t>ROC Curve</a:t>
+            </a:r>
+          </a:p>
+        </p:txBody>
+      </p:sp>
+    </p:spTree>
+    <p:extLst>
+      <p:ext uri="{BB962C8B-B14F-4D97-AF65-F5344CB8AC3E}">
+        <p14:creationId xmlns:p14="http://schemas.microsoft.com/office/powerpoint/2010/main" val="2980106256"/>
+      </p:ext>
+    </p:extLst>
+  </p:cSld>
+  <p:clrMapOvr>
+    <a:masterClrMapping/>
+  </p:clrMapOvr>
+  <p:transition/>
+</p:sld>
+</file>
+
+<file path=ppt/slides/slide19.xml><?xml version="1.0" encoding="utf-8"?>
+<p:sld xmlns:a="http://schemas.openxmlformats.org/drawingml/2006/main" xmlns:r="http://schemas.openxmlformats.org/officeDocument/2006/relationships" xmlns:p="http://schemas.openxmlformats.org/presentationml/2006/main">
+  <p:cSld>
+    <p:spTree>
+      <p:nvGrpSpPr>
+        <p:cNvPr id="1" name=""/>
+        <p:cNvGrpSpPr/>
+        <p:nvPr/>
+      </p:nvGrpSpPr>
+      <p:grpSpPr>
+        <a:xfrm>
+          <a:off x="0" y="0"/>
+          <a:ext cx="0" cy="0"/>
+          <a:chOff x="0" y="0"/>
+          <a:chExt cx="0" cy="0"/>
+        </a:xfrm>
+      </p:grpSpPr>
+      <p:sp>
+        <p:nvSpPr>
+          <p:cNvPr id="5" name="TextBox 4"/>
+          <p:cNvSpPr txBox="1"/>
+          <p:nvPr/>
+        </p:nvSpPr>
+        <p:spPr>
+          <a:xfrm>
             <a:off x="4905327" y="1444544"/>
             <a:ext cx="6548704" cy="1938992"/>
           </a:xfrm>
@@ -7567,7 +8715,7 @@
               <a:pPr>
                 <a:defRPr/>
               </a:pPr>
-              <a:t>18</a:t>
+              <a:t>19</a:t>
             </a:fld>
             <a:endParaRPr lang="en-US"/>
           </a:p>
@@ -8674,7 +9822,7 @@
 </p:sld>
 </file>
 
-<file path=ppt/slides/slide19.xml><?xml version="1.0" encoding="utf-8"?>
+<file path=ppt/slides/slide2.xml><?xml version="1.0" encoding="utf-8"?>
 <p:sld xmlns:a="http://schemas.openxmlformats.org/drawingml/2006/main" xmlns:r="http://schemas.openxmlformats.org/officeDocument/2006/relationships" xmlns:p="http://schemas.openxmlformats.org/presentationml/2006/main">
   <p:cSld>
     <p:spTree>
@@ -8693,6 +9841,135 @@
       </p:grpSpPr>
       <p:sp>
         <p:nvSpPr>
+          <p:cNvPr id="2" name="Title 1">
+            <a:extLst>
+              <a:ext uri="{FF2B5EF4-FFF2-40B4-BE49-F238E27FC236}">
+                <a16:creationId xmlns:a16="http://schemas.microsoft.com/office/drawing/2014/main" id="{5F2B5E13-80FA-914C-9186-E1F1A98E5340}"/>
+              </a:ext>
+            </a:extLst>
+          </p:cNvPr>
+          <p:cNvSpPr>
+            <a:spLocks noGrp="1"/>
+          </p:cNvSpPr>
+          <p:nvPr>
+            <p:ph type="title"/>
+          </p:nvPr>
+        </p:nvSpPr>
+        <p:spPr/>
+        <p:txBody>
+          <a:bodyPr>
+            <a:normAutofit/>
+          </a:bodyPr>
+          <a:lstStyle/>
+          <a:p>
+            <a:r>
+              <a:rPr lang="en-US" dirty="0"/>
+              <a:t>Topics	</a:t>
+            </a:r>
+          </a:p>
+        </p:txBody>
+      </p:sp>
+      <p:sp>
+        <p:nvSpPr>
+          <p:cNvPr id="3" name="Content Placeholder 2">
+            <a:extLst>
+              <a:ext uri="{FF2B5EF4-FFF2-40B4-BE49-F238E27FC236}">
+                <a16:creationId xmlns:a16="http://schemas.microsoft.com/office/drawing/2014/main" id="{A22FDBCF-9E8F-6F4B-B28E-152F058D98EF}"/>
+              </a:ext>
+            </a:extLst>
+          </p:cNvPr>
+          <p:cNvSpPr>
+            <a:spLocks noGrp="1"/>
+          </p:cNvSpPr>
+          <p:nvPr>
+            <p:ph idx="1"/>
+          </p:nvPr>
+        </p:nvSpPr>
+        <p:spPr/>
+        <p:txBody>
+          <a:bodyPr/>
+          <a:lstStyle/>
+          <a:p>
+            <a:r>
+              <a:rPr lang="en-US" dirty="0"/>
+              <a:t>Regression</a:t>
+            </a:r>
+          </a:p>
+          <a:p>
+            <a:pPr lvl="1"/>
+            <a:r>
+              <a:rPr lang="en-US" dirty="0"/>
+              <a:t>Assessing the accuracy of model coefficients</a:t>
+            </a:r>
+          </a:p>
+          <a:p>
+            <a:pPr lvl="1"/>
+            <a:r>
+              <a:rPr lang="en-US" dirty="0"/>
+              <a:t>RMSE – Root Mean Squared Error</a:t>
+            </a:r>
+          </a:p>
+          <a:p>
+            <a:r>
+              <a:rPr lang="en-US" dirty="0">
+                <a:effectLst/>
+              </a:rPr>
+              <a:t>Classification</a:t>
+            </a:r>
+          </a:p>
+          <a:p>
+            <a:pPr lvl="1"/>
+            <a:r>
+              <a:rPr lang="en-US" dirty="0">
+                <a:effectLst/>
+              </a:rPr>
+              <a:t>Confusion matrix</a:t>
+            </a:r>
+          </a:p>
+          <a:p>
+            <a:pPr lvl="1"/>
+            <a:r>
+              <a:rPr lang="en-US" dirty="0"/>
+              <a:t>ROC Curve</a:t>
+            </a:r>
+            <a:endParaRPr lang="en-US" dirty="0">
+              <a:effectLst/>
+            </a:endParaRPr>
+          </a:p>
+        </p:txBody>
+      </p:sp>
+    </p:spTree>
+    <p:extLst>
+      <p:ext uri="{BB962C8B-B14F-4D97-AF65-F5344CB8AC3E}">
+        <p14:creationId xmlns:p14="http://schemas.microsoft.com/office/powerpoint/2010/main" val="1701353346"/>
+      </p:ext>
+    </p:extLst>
+  </p:cSld>
+  <p:clrMapOvr>
+    <a:masterClrMapping/>
+  </p:clrMapOvr>
+</p:sld>
+</file>
+
+<file path=ppt/slides/slide20.xml><?xml version="1.0" encoding="utf-8"?>
+<p:sld xmlns:a="http://schemas.openxmlformats.org/drawingml/2006/main" xmlns:r="http://schemas.openxmlformats.org/officeDocument/2006/relationships" xmlns:p="http://schemas.openxmlformats.org/presentationml/2006/main">
+  <p:cSld>
+    <p:spTree>
+      <p:nvGrpSpPr>
+        <p:cNvPr id="1" name=""/>
+        <p:cNvGrpSpPr/>
+        <p:nvPr/>
+      </p:nvGrpSpPr>
+      <p:grpSpPr>
+        <a:xfrm>
+          <a:off x="0" y="0"/>
+          <a:ext cx="0" cy="0"/>
+          <a:chOff x="0" y="0"/>
+          <a:chExt cx="0" cy="0"/>
+        </a:xfrm>
+      </p:grpSpPr>
+      <p:sp>
+        <p:nvSpPr>
           <p:cNvPr id="5" name="TextBox 4"/>
           <p:cNvSpPr txBox="1"/>
           <p:nvPr/>
@@ -8834,7 +10111,7 @@
               <a:pPr>
                 <a:defRPr/>
               </a:pPr>
-              <a:t>19</a:t>
+              <a:t>20</a:t>
             </a:fld>
             <a:endParaRPr lang="en-US"/>
           </a:p>
@@ -9873,7 +11150,7 @@
 </p:sld>
 </file>
 
-<file path=ppt/slides/slide2.xml><?xml version="1.0" encoding="utf-8"?>
+<file path=ppt/slides/slide21.xml><?xml version="1.0" encoding="utf-8"?>
 <p:sld xmlns:a="http://schemas.openxmlformats.org/drawingml/2006/main" xmlns:r="http://schemas.openxmlformats.org/officeDocument/2006/relationships" xmlns:p="http://schemas.openxmlformats.org/presentationml/2006/main">
   <p:cSld>
     <p:spTree>
@@ -9892,135 +11169,6 @@
       </p:grpSpPr>
       <p:sp>
         <p:nvSpPr>
-          <p:cNvPr id="2" name="Title 1">
-            <a:extLst>
-              <a:ext uri="{FF2B5EF4-FFF2-40B4-BE49-F238E27FC236}">
-                <a16:creationId xmlns:a16="http://schemas.microsoft.com/office/drawing/2014/main" id="{5F2B5E13-80FA-914C-9186-E1F1A98E5340}"/>
-              </a:ext>
-            </a:extLst>
-          </p:cNvPr>
-          <p:cNvSpPr>
-            <a:spLocks noGrp="1"/>
-          </p:cNvSpPr>
-          <p:nvPr>
-            <p:ph type="title"/>
-          </p:nvPr>
-        </p:nvSpPr>
-        <p:spPr/>
-        <p:txBody>
-          <a:bodyPr>
-            <a:normAutofit/>
-          </a:bodyPr>
-          <a:lstStyle/>
-          <a:p>
-            <a:r>
-              <a:rPr lang="en-US" dirty="0"/>
-              <a:t>Topics	</a:t>
-            </a:r>
-          </a:p>
-        </p:txBody>
-      </p:sp>
-      <p:sp>
-        <p:nvSpPr>
-          <p:cNvPr id="3" name="Content Placeholder 2">
-            <a:extLst>
-              <a:ext uri="{FF2B5EF4-FFF2-40B4-BE49-F238E27FC236}">
-                <a16:creationId xmlns:a16="http://schemas.microsoft.com/office/drawing/2014/main" id="{A22FDBCF-9E8F-6F4B-B28E-152F058D98EF}"/>
-              </a:ext>
-            </a:extLst>
-          </p:cNvPr>
-          <p:cNvSpPr>
-            <a:spLocks noGrp="1"/>
-          </p:cNvSpPr>
-          <p:nvPr>
-            <p:ph idx="1"/>
-          </p:nvPr>
-        </p:nvSpPr>
-        <p:spPr/>
-        <p:txBody>
-          <a:bodyPr/>
-          <a:lstStyle/>
-          <a:p>
-            <a:r>
-              <a:rPr lang="en-US" dirty="0"/>
-              <a:t>Regression</a:t>
-            </a:r>
-          </a:p>
-          <a:p>
-            <a:pPr lvl="1"/>
-            <a:r>
-              <a:rPr lang="en-US" dirty="0"/>
-              <a:t>Assessing the accuracy of model coefficients</a:t>
-            </a:r>
-          </a:p>
-          <a:p>
-            <a:pPr lvl="1"/>
-            <a:r>
-              <a:rPr lang="en-US" dirty="0"/>
-              <a:t>RMSE – Root Mean Squared Error</a:t>
-            </a:r>
-          </a:p>
-          <a:p>
-            <a:r>
-              <a:rPr lang="en-US" dirty="0">
-                <a:effectLst/>
-              </a:rPr>
-              <a:t>Classification</a:t>
-            </a:r>
-          </a:p>
-          <a:p>
-            <a:pPr lvl="1"/>
-            <a:r>
-              <a:rPr lang="en-US" dirty="0">
-                <a:effectLst/>
-              </a:rPr>
-              <a:t>Confusion matrix</a:t>
-            </a:r>
-          </a:p>
-          <a:p>
-            <a:pPr lvl="1"/>
-            <a:r>
-              <a:rPr lang="en-US" dirty="0"/>
-              <a:t>ROC Curve</a:t>
-            </a:r>
-            <a:endParaRPr lang="en-US" dirty="0">
-              <a:effectLst/>
-            </a:endParaRPr>
-          </a:p>
-        </p:txBody>
-      </p:sp>
-    </p:spTree>
-    <p:extLst>
-      <p:ext uri="{BB962C8B-B14F-4D97-AF65-F5344CB8AC3E}">
-        <p14:creationId xmlns:p14="http://schemas.microsoft.com/office/powerpoint/2010/main" val="1701353346"/>
-      </p:ext>
-    </p:extLst>
-  </p:cSld>
-  <p:clrMapOvr>
-    <a:masterClrMapping/>
-  </p:clrMapOvr>
-</p:sld>
-</file>
-
-<file path=ppt/slides/slide20.xml><?xml version="1.0" encoding="utf-8"?>
-<p:sld xmlns:a="http://schemas.openxmlformats.org/drawingml/2006/main" xmlns:r="http://schemas.openxmlformats.org/officeDocument/2006/relationships" xmlns:p="http://schemas.openxmlformats.org/presentationml/2006/main">
-  <p:cSld>
-    <p:spTree>
-      <p:nvGrpSpPr>
-        <p:cNvPr id="1" name=""/>
-        <p:cNvGrpSpPr/>
-        <p:nvPr/>
-      </p:nvGrpSpPr>
-      <p:grpSpPr>
-        <a:xfrm>
-          <a:off x="0" y="0"/>
-          <a:ext cx="0" cy="0"/>
-          <a:chOff x="0" y="0"/>
-          <a:chExt cx="0" cy="0"/>
-        </a:xfrm>
-      </p:grpSpPr>
-      <p:sp>
-        <p:nvSpPr>
           <p:cNvPr id="5" name="TextBox 4"/>
           <p:cNvSpPr txBox="1"/>
           <p:nvPr/>
@@ -10155,7 +11303,7 @@
               <a:pPr>
                 <a:defRPr/>
               </a:pPr>
-              <a:t>20</a:t>
+              <a:t>21</a:t>
             </a:fld>
             <a:endParaRPr lang="en-US"/>
           </a:p>
@@ -13494,7 +14642,7 @@
               <a:rPr lang="en-US" sz="2400" dirty="0">
                 <a:latin typeface="PFDinTextCompPro-Italic" panose="02000506020000020004" pitchFamily="2" charset="0"/>
               </a:rPr>
-              <a:t>TPR = TP / Actual = 100/105 = 0.95</a:t>
+              <a:t>TPR = TP / T = 100/105 = 0.95</a:t>
             </a:r>
           </a:p>
           <a:p>
@@ -13597,7 +14745,7 @@
               <a:rPr lang="en-US" sz="2400" dirty="0">
                 <a:latin typeface="PFDinTextCompPro-Italic" panose="02000506020000020004" pitchFamily="2" charset="0"/>
               </a:rPr>
-              <a:t>FPR = (FP / Actual NO) = 10/60 = 0.17</a:t>
+              <a:t>FPR = (FP / F) = 10/60 = 0.17</a:t>
             </a:r>
           </a:p>
         </p:txBody>
@@ -13688,7 +14836,7 @@
               <a:rPr lang="en-US" sz="2400" dirty="0">
                 <a:latin typeface="PFDinTextCompPro-Italic" panose="02000506020000020004" pitchFamily="2" charset="0"/>
               </a:rPr>
-              <a:t>TNR = (TN / Actual NO) = 50/60 = 0.83</a:t>
+              <a:t>TNR = (TN / F) = 50/60 = 0.83</a:t>
             </a:r>
           </a:p>
         </p:txBody>

</xml_diff>